<commit_message>
Added more simulation images
</commit_message>
<xml_diff>
--- a/Federated Kalman filter.pptx
+++ b/Federated Kalman filter.pptx
@@ -5,7 +5,7 @@
     <p:sldMasterId id="2147483648" r:id="rId1"/>
   </p:sldMasterIdLst>
   <p:notesMasterIdLst>
-    <p:notesMasterId r:id="rId19"/>
+    <p:notesMasterId r:id="rId21"/>
   </p:notesMasterIdLst>
   <p:sldIdLst>
     <p:sldId id="256" r:id="rId2"/>
@@ -25,6 +25,8 @@
     <p:sldId id="270" r:id="rId16"/>
     <p:sldId id="271" r:id="rId17"/>
     <p:sldId id="272" r:id="rId18"/>
+    <p:sldId id="273" r:id="rId19"/>
+    <p:sldId id="274" r:id="rId20"/>
   </p:sldIdLst>
   <p:sldSz cx="12192000" cy="6858000"/>
   <p:notesSz cx="6858000" cy="9144000"/>
@@ -268,7 +270,7 @@
           <a:p>
             <a:fld id="{9FBC8B04-6135-4B93-86DB-9D89BE1381F3}" type="datetimeFigureOut">
               <a:rPr lang="he-IL" smtClean="0"/>
-              <a:t>ט"ז/אלול/תשפ"ה</a:t>
+              <a:t>כ"ד/אלול/תשפ"ה</a:t>
             </a:fld>
             <a:endParaRPr lang="he-IL"/>
           </a:p>
@@ -823,6 +825,90 @@
 </p:notes>
 </file>
 
+<file path=ppt/notesSlides/notesSlide4.xml><?xml version="1.0" encoding="utf-8"?>
+<p:notes xmlns:a="http://schemas.openxmlformats.org/drawingml/2006/main" xmlns:r="http://schemas.openxmlformats.org/officeDocument/2006/relationships" xmlns:p="http://schemas.openxmlformats.org/presentationml/2006/main">
+  <p:cSld>
+    <p:spTree>
+      <p:nvGrpSpPr>
+        <p:cNvPr id="1" name=""/>
+        <p:cNvGrpSpPr/>
+        <p:nvPr/>
+      </p:nvGrpSpPr>
+      <p:grpSpPr>
+        <a:xfrm>
+          <a:off x="0" y="0"/>
+          <a:ext cx="0" cy="0"/>
+          <a:chOff x="0" y="0"/>
+          <a:chExt cx="0" cy="0"/>
+        </a:xfrm>
+      </p:grpSpPr>
+      <p:sp>
+        <p:nvSpPr>
+          <p:cNvPr id="2" name="Slide Image Placeholder 1"/>
+          <p:cNvSpPr>
+            <a:spLocks noGrp="1" noRot="1" noChangeAspect="1"/>
+          </p:cNvSpPr>
+          <p:nvPr>
+            <p:ph type="sldImg"/>
+          </p:nvPr>
+        </p:nvSpPr>
+        <p:spPr/>
+      </p:sp>
+      <p:sp>
+        <p:nvSpPr>
+          <p:cNvPr id="3" name="Notes Placeholder 2"/>
+          <p:cNvSpPr>
+            <a:spLocks noGrp="1"/>
+          </p:cNvSpPr>
+          <p:nvPr>
+            <p:ph type="body" idx="1"/>
+          </p:nvPr>
+        </p:nvSpPr>
+        <p:spPr/>
+        <p:txBody>
+          <a:bodyPr/>
+          <a:lstStyle/>
+          <a:p>
+            <a:endParaRPr lang="he-IL" dirty="0"/>
+          </a:p>
+        </p:txBody>
+      </p:sp>
+      <p:sp>
+        <p:nvSpPr>
+          <p:cNvPr id="4" name="Slide Number Placeholder 3"/>
+          <p:cNvSpPr>
+            <a:spLocks noGrp="1"/>
+          </p:cNvSpPr>
+          <p:nvPr>
+            <p:ph type="sldNum" sz="quarter" idx="5"/>
+          </p:nvPr>
+        </p:nvSpPr>
+        <p:spPr/>
+        <p:txBody>
+          <a:bodyPr/>
+          <a:lstStyle/>
+          <a:p>
+            <a:fld id="{C64F4B96-EF2B-4E12-A000-E576EF522EF2}" type="slidenum">
+              <a:rPr lang="he-IL" smtClean="0"/>
+              <a:t>17</a:t>
+            </a:fld>
+            <a:endParaRPr lang="he-IL"/>
+          </a:p>
+        </p:txBody>
+      </p:sp>
+    </p:spTree>
+    <p:extLst>
+      <p:ext uri="{BB962C8B-B14F-4D97-AF65-F5344CB8AC3E}">
+        <p14:creationId xmlns:p14="http://schemas.microsoft.com/office/powerpoint/2010/main" val="3184789818"/>
+      </p:ext>
+    </p:extLst>
+  </p:cSld>
+  <p:clrMapOvr>
+    <a:masterClrMapping/>
+  </p:clrMapOvr>
+</p:notes>
+</file>
+
 <file path=ppt/slideLayouts/slideLayout1.xml><?xml version="1.0" encoding="utf-8"?>
 <p:sldLayout xmlns:a="http://schemas.openxmlformats.org/drawingml/2006/main" xmlns:r="http://schemas.openxmlformats.org/officeDocument/2006/relationships" xmlns:p="http://schemas.openxmlformats.org/presentationml/2006/main" type="title" preserve="1">
   <p:cSld name="שקופית כותרת">
@@ -1057,7 +1143,7 @@
             <a:fld id="{B61BEF0D-F0BB-DE4B-95CE-6DB70DBA9567}" type="datetimeFigureOut">
               <a:rPr lang="en-US" smtClean="0"/>
               <a:pPr/>
-              <a:t>9/9/2025</a:t>
+              <a:t>9/17/2025</a:t>
             </a:fld>
             <a:endParaRPr lang="en-US" dirty="0"/>
           </a:p>
@@ -1405,7 +1491,7 @@
             <a:fld id="{B61BEF0D-F0BB-DE4B-95CE-6DB70DBA9567}" type="datetimeFigureOut">
               <a:rPr lang="en-US" smtClean="0"/>
               <a:pPr/>
-              <a:t>9/9/2025</a:t>
+              <a:t>9/17/2025</a:t>
             </a:fld>
             <a:endParaRPr lang="en-US" dirty="0"/>
           </a:p>
@@ -1707,7 +1793,7 @@
             <a:fld id="{B61BEF0D-F0BB-DE4B-95CE-6DB70DBA9567}" type="datetimeFigureOut">
               <a:rPr lang="en-US" smtClean="0"/>
               <a:pPr/>
-              <a:t>9/9/2025</a:t>
+              <a:t>9/17/2025</a:t>
             </a:fld>
             <a:endParaRPr lang="en-US" dirty="0"/>
           </a:p>
@@ -2299,7 +2385,7 @@
             <a:fld id="{B61BEF0D-F0BB-DE4B-95CE-6DB70DBA9567}" type="datetimeFigureOut">
               <a:rPr lang="en-US" smtClean="0"/>
               <a:pPr/>
-              <a:t>9/9/2025</a:t>
+              <a:t>9/17/2025</a:t>
             </a:fld>
             <a:endParaRPr lang="en-US" dirty="0"/>
           </a:p>
@@ -2601,7 +2687,7 @@
             <a:fld id="{B61BEF0D-F0BB-DE4B-95CE-6DB70DBA9567}" type="datetimeFigureOut">
               <a:rPr lang="en-US" smtClean="0"/>
               <a:pPr/>
-              <a:t>9/9/2025</a:t>
+              <a:t>9/17/2025</a:t>
             </a:fld>
             <a:endParaRPr lang="en-US" dirty="0"/>
           </a:p>
@@ -3187,7 +3273,7 @@
             <a:fld id="{B61BEF0D-F0BB-DE4B-95CE-6DB70DBA9567}" type="datetimeFigureOut">
               <a:rPr lang="en-US" smtClean="0"/>
               <a:pPr/>
-              <a:t>9/9/2025</a:t>
+              <a:t>9/17/2025</a:t>
             </a:fld>
             <a:endParaRPr lang="en-US" dirty="0"/>
           </a:p>
@@ -3538,7 +3624,7 @@
             <a:fld id="{B61BEF0D-F0BB-DE4B-95CE-6DB70DBA9567}" type="datetimeFigureOut">
               <a:rPr lang="en-US" smtClean="0"/>
               <a:pPr/>
-              <a:t>9/9/2025</a:t>
+              <a:t>9/17/2025</a:t>
             </a:fld>
             <a:endParaRPr lang="en-US" dirty="0"/>
           </a:p>
@@ -3760,7 +3846,7 @@
             <a:fld id="{B61BEF0D-F0BB-DE4B-95CE-6DB70DBA9567}" type="datetimeFigureOut">
               <a:rPr lang="en-US" smtClean="0"/>
               <a:pPr/>
-              <a:t>9/9/2025</a:t>
+              <a:t>9/17/2025</a:t>
             </a:fld>
             <a:endParaRPr lang="en-US" dirty="0"/>
           </a:p>
@@ -4046,7 +4132,7 @@
             <a:fld id="{B61BEF0D-F0BB-DE4B-95CE-6DB70DBA9567}" type="datetimeFigureOut">
               <a:rPr lang="en-US" smtClean="0"/>
               <a:pPr/>
-              <a:t>9/9/2025</a:t>
+              <a:t>9/17/2025</a:t>
             </a:fld>
             <a:endParaRPr lang="en-US" dirty="0"/>
           </a:p>
@@ -4300,7 +4386,7 @@
             <a:fld id="{B61BEF0D-F0BB-DE4B-95CE-6DB70DBA9567}" type="datetimeFigureOut">
               <a:rPr lang="en-US" smtClean="0"/>
               <a:pPr/>
-              <a:t>9/9/2025</a:t>
+              <a:t>9/17/2025</a:t>
             </a:fld>
             <a:endParaRPr lang="en-US" dirty="0"/>
           </a:p>
@@ -4600,7 +4686,7 @@
             <a:fld id="{B61BEF0D-F0BB-DE4B-95CE-6DB70DBA9567}" type="datetimeFigureOut">
               <a:rPr lang="en-US" smtClean="0"/>
               <a:pPr/>
-              <a:t>9/9/2025</a:t>
+              <a:t>9/17/2025</a:t>
             </a:fld>
             <a:endParaRPr lang="en-US" dirty="0"/>
           </a:p>
@@ -4931,7 +5017,7 @@
             <a:fld id="{B61BEF0D-F0BB-DE4B-95CE-6DB70DBA9567}" type="datetimeFigureOut">
               <a:rPr lang="en-US" smtClean="0"/>
               <a:pPr/>
-              <a:t>9/9/2025</a:t>
+              <a:t>9/17/2025</a:t>
             </a:fld>
             <a:endParaRPr lang="en-US" dirty="0"/>
           </a:p>
@@ -5366,7 +5452,7 @@
             <a:fld id="{B61BEF0D-F0BB-DE4B-95CE-6DB70DBA9567}" type="datetimeFigureOut">
               <a:rPr lang="en-US" smtClean="0"/>
               <a:pPr/>
-              <a:t>9/9/2025</a:t>
+              <a:t>9/17/2025</a:t>
             </a:fld>
             <a:endParaRPr lang="en-US" dirty="0"/>
           </a:p>
@@ -5547,7 +5633,7 @@
             <a:fld id="{B61BEF0D-F0BB-DE4B-95CE-6DB70DBA9567}" type="datetimeFigureOut">
               <a:rPr lang="en-US" smtClean="0"/>
               <a:pPr/>
-              <a:t>9/9/2025</a:t>
+              <a:t>9/17/2025</a:t>
             </a:fld>
             <a:endParaRPr lang="en-US" dirty="0"/>
           </a:p>
@@ -5696,7 +5782,7 @@
             <a:fld id="{B61BEF0D-F0BB-DE4B-95CE-6DB70DBA9567}" type="datetimeFigureOut">
               <a:rPr lang="en-US" smtClean="0"/>
               <a:pPr/>
-              <a:t>9/9/2025</a:t>
+              <a:t>9/17/2025</a:t>
             </a:fld>
             <a:endParaRPr lang="en-US" dirty="0"/>
           </a:p>
@@ -6021,7 +6107,7 @@
             <a:fld id="{B61BEF0D-F0BB-DE4B-95CE-6DB70DBA9567}" type="datetimeFigureOut">
               <a:rPr lang="en-US" smtClean="0"/>
               <a:pPr/>
-              <a:t>9/9/2025</a:t>
+              <a:t>9/17/2025</a:t>
             </a:fld>
             <a:endParaRPr lang="en-US" dirty="0"/>
           </a:p>
@@ -6369,7 +6455,7 @@
             <a:fld id="{B61BEF0D-F0BB-DE4B-95CE-6DB70DBA9567}" type="datetimeFigureOut">
               <a:rPr lang="en-US" smtClean="0"/>
               <a:pPr/>
-              <a:t>9/9/2025</a:t>
+              <a:t>9/17/2025</a:t>
             </a:fld>
             <a:endParaRPr lang="en-US" dirty="0"/>
           </a:p>
@@ -6598,7 +6684,7 @@
             <a:fld id="{B61BEF0D-F0BB-DE4B-95CE-6DB70DBA9567}" type="datetimeFigureOut">
               <a:rPr lang="en-US" smtClean="0"/>
               <a:pPr/>
-              <a:t>9/9/2025</a:t>
+              <a:t>9/17/2025</a:t>
             </a:fld>
             <a:endParaRPr lang="en-US" dirty="0"/>
           </a:p>
@@ -7229,10 +7315,10 @@
           <a:lstStyle/>
           <a:p>
             <a:r>
-              <a:rPr lang="en-US" dirty="0"/>
+              <a:rPr lang="en-US" b="1" dirty="0"/>
               <a:t>Federated Kalman filter</a:t>
             </a:r>
-            <a:endParaRPr lang="LID4096" dirty="0"/>
+            <a:endParaRPr lang="LID4096" b="1" dirty="0"/>
           </a:p>
         </p:txBody>
       </p:sp>
@@ -7259,14 +7345,14 @@
           <a:p>
             <a:pPr algn="r"/>
             <a:r>
-              <a:rPr lang="he-IL" dirty="0"/>
+              <a:rPr lang="he-IL" b="1" dirty="0"/>
               <a:t>אילן </a:t>
             </a:r>
             <a:r>
-              <a:rPr lang="he-IL" dirty="0" err="1"/>
+              <a:rPr lang="he-IL" b="1" dirty="0" err="1"/>
               <a:t>אלזם</a:t>
             </a:r>
-            <a:endParaRPr lang="LID4096" dirty="0"/>
+            <a:endParaRPr lang="LID4096" b="1" dirty="0"/>
           </a:p>
         </p:txBody>
       </p:sp>
@@ -7322,14 +7408,14 @@
           <a:lstStyle/>
           <a:p>
             <a:r>
-              <a:rPr lang="he-IL" dirty="0"/>
+              <a:rPr lang="he-IL" b="1" dirty="0"/>
               <a:t>אלגוריתם ה </a:t>
             </a:r>
             <a:r>
-              <a:rPr lang="en-US" dirty="0"/>
+              <a:rPr lang="en-US" b="1" dirty="0"/>
               <a:t>FKF</a:t>
             </a:r>
-            <a:endParaRPr lang="he-IL" dirty="0"/>
+            <a:endParaRPr lang="he-IL" b="1" dirty="0"/>
           </a:p>
         </p:txBody>
       </p:sp>
@@ -7353,7 +7439,7 @@
             </p:nvSpPr>
             <p:spPr/>
             <p:txBody>
-              <a:bodyPr/>
+              <a:bodyPr anchor="t"/>
               <a:lstStyle/>
               <a:p>
                 <a:pPr marL="342900" indent="-342900">
@@ -7610,7 +7696,7 @@
               <a:blipFill>
                 <a:blip r:embed="rId3"/>
                 <a:stretch>
-                  <a:fillRect r="-602"/>
+                  <a:fillRect t="-1002" r="-602"/>
                 </a:stretch>
               </a:blipFill>
             </p:spPr>
@@ -7681,14 +7767,14 @@
           <a:lstStyle/>
           <a:p>
             <a:r>
-              <a:rPr lang="he-IL" dirty="0"/>
+              <a:rPr lang="he-IL" b="1" dirty="0"/>
               <a:t>השוואה – </a:t>
             </a:r>
             <a:r>
-              <a:rPr lang="en-US" dirty="0"/>
+              <a:rPr lang="en-US" b="1" dirty="0"/>
               <a:t>CKF vs FKF</a:t>
             </a:r>
-            <a:endParaRPr lang="he-IL" dirty="0"/>
+            <a:endParaRPr lang="he-IL" b="1" dirty="0"/>
           </a:p>
         </p:txBody>
       </p:sp>
@@ -7773,14 +7859,14 @@
           <a:lstStyle/>
           <a:p>
             <a:r>
-              <a:rPr lang="he-IL" dirty="0"/>
+              <a:rPr lang="he-IL" b="1" dirty="0"/>
               <a:t>השוואה – </a:t>
             </a:r>
             <a:r>
-              <a:rPr lang="en-US" dirty="0"/>
+              <a:rPr lang="en-US" b="1" dirty="0"/>
               <a:t>CKF vs FKF</a:t>
             </a:r>
-            <a:endParaRPr lang="he-IL" dirty="0"/>
+            <a:endParaRPr lang="he-IL" b="1" dirty="0"/>
           </a:p>
         </p:txBody>
       </p:sp>
@@ -7865,14 +7951,14 @@
           <a:lstStyle/>
           <a:p>
             <a:r>
-              <a:rPr lang="he-IL" dirty="0"/>
+              <a:rPr lang="he-IL" b="1" dirty="0"/>
               <a:t>השוואה – </a:t>
             </a:r>
             <a:r>
-              <a:rPr lang="en-US" dirty="0"/>
+              <a:rPr lang="en-US" b="1" dirty="0"/>
               <a:t>CKF vs FKF</a:t>
             </a:r>
-            <a:endParaRPr lang="he-IL" dirty="0"/>
+            <a:endParaRPr lang="he-IL" b="1" dirty="0"/>
           </a:p>
         </p:txBody>
       </p:sp>
@@ -7957,22 +8043,22 @@
           <a:lstStyle/>
           <a:p>
             <a:r>
-              <a:rPr lang="he-IL" dirty="0"/>
+              <a:rPr lang="he-IL" b="1" dirty="0"/>
               <a:t>יתרונות ה </a:t>
             </a:r>
             <a:r>
-              <a:rPr lang="en-US" dirty="0"/>
+              <a:rPr lang="en-US" b="1" dirty="0"/>
               <a:t>FKF</a:t>
             </a:r>
             <a:r>
-              <a:rPr lang="he-IL" dirty="0"/>
+              <a:rPr lang="he-IL" b="1" dirty="0"/>
               <a:t> על ה </a:t>
             </a:r>
             <a:r>
-              <a:rPr lang="en-US" dirty="0"/>
+              <a:rPr lang="en-US" b="1" dirty="0"/>
               <a:t>CKF</a:t>
             </a:r>
-            <a:endParaRPr lang="he-IL" dirty="0"/>
+            <a:endParaRPr lang="he-IL" b="1" dirty="0"/>
           </a:p>
         </p:txBody>
       </p:sp>
@@ -7994,7 +8080,7 @@
         </p:nvSpPr>
         <p:spPr/>
         <p:txBody>
-          <a:bodyPr>
+          <a:bodyPr anchor="t">
             <a:normAutofit/>
           </a:bodyPr>
           <a:lstStyle/>
@@ -8075,36 +8161,118 @@
           <a:chExt cx="0" cy="0"/>
         </a:xfrm>
       </p:grpSpPr>
-      <p:sp>
-        <p:nvSpPr>
-          <p:cNvPr id="2" name="Title 1">
-            <a:extLst>
-              <a:ext uri="{FF2B5EF4-FFF2-40B4-BE49-F238E27FC236}">
-                <a16:creationId xmlns:a16="http://schemas.microsoft.com/office/drawing/2014/main" id="{6853A274-BB0B-8EAD-6E04-6C0D93ADE66B}"/>
-              </a:ext>
-            </a:extLst>
-          </p:cNvPr>
-          <p:cNvSpPr>
-            <a:spLocks noGrp="1"/>
-          </p:cNvSpPr>
-          <p:nvPr>
-            <p:ph type="title"/>
-          </p:nvPr>
-        </p:nvSpPr>
-        <p:spPr/>
-        <p:txBody>
-          <a:bodyPr/>
-          <a:lstStyle/>
-          <a:p>
-            <a:r>
-              <a:rPr lang="he-IL" dirty="0"/>
-              <a:t>אלגוריתם לאיתור תקלות מבוסס מבחן חי-בריבוע וחלון נע</a:t>
-            </a:r>
-          </a:p>
-        </p:txBody>
-      </p:sp>
-      <mc:AlternateContent xmlns:mc="http://schemas.openxmlformats.org/markup-compatibility/2006">
-        <mc:Choice xmlns:a14="http://schemas.microsoft.com/office/drawing/2010/main" Requires="a14">
+      <mc:AlternateContent xmlns:mc="http://schemas.openxmlformats.org/markup-compatibility/2006" xmlns:a14="http://schemas.microsoft.com/office/drawing/2010/main">
+        <mc:Choice Requires="a14">
+          <p:sp>
+            <p:nvSpPr>
+              <p:cNvPr id="2" name="Title 1">
+                <a:extLst>
+                  <a:ext uri="{FF2B5EF4-FFF2-40B4-BE49-F238E27FC236}">
+                    <a16:creationId xmlns:a16="http://schemas.microsoft.com/office/drawing/2014/main" id="{6853A274-BB0B-8EAD-6E04-6C0D93ADE66B}"/>
+                  </a:ext>
+                </a:extLst>
+              </p:cNvPr>
+              <p:cNvSpPr>
+                <a:spLocks noGrp="1"/>
+              </p:cNvSpPr>
+              <p:nvPr>
+                <p:ph type="title"/>
+              </p:nvPr>
+            </p:nvSpPr>
+            <p:spPr/>
+            <p:txBody>
+              <a:bodyPr/>
+              <a:lstStyle/>
+              <a:p>
+                <a:r>
+                  <a:rPr lang="he-IL" b="1" dirty="0"/>
+                  <a:t>אלגוריתם לאיתור תקלות מבוסס מבחן </a:t>
+                </a:r>
+                <a14:m>
+                  <m:oMath xmlns:m="http://schemas.openxmlformats.org/officeDocument/2006/math">
+                    <m:r>
+                      <a:rPr lang="en-US" b="1" i="0" smtClean="0">
+                        <a:latin typeface="Cambria Math" panose="02040503050406030204" pitchFamily="18" charset="0"/>
+                      </a:rPr>
+                      <m:t> </m:t>
+                    </m:r>
+                    <m:sSup>
+                      <m:sSupPr>
+                        <m:ctrlPr>
+                          <a:rPr lang="en-US" b="1" i="1" smtClean="0">
+                            <a:latin typeface="Cambria Math" panose="02040503050406030204" pitchFamily="18" charset="0"/>
+                          </a:rPr>
+                        </m:ctrlPr>
+                      </m:sSupPr>
+                      <m:e>
+                        <m:r>
+                          <a:rPr lang="he-IL" b="1" i="1" smtClean="0">
+                            <a:latin typeface="Cambria Math" panose="02040503050406030204" pitchFamily="18" charset="0"/>
+                          </a:rPr>
+                          <m:t>𝝌</m:t>
+                        </m:r>
+                      </m:e>
+                      <m:sup>
+                        <m:r>
+                          <a:rPr lang="en-US" b="1" i="1" smtClean="0">
+                            <a:latin typeface="Cambria Math" panose="02040503050406030204" pitchFamily="18" charset="0"/>
+                          </a:rPr>
+                          <m:t>𝟐</m:t>
+                        </m:r>
+                      </m:sup>
+                    </m:sSup>
+                  </m:oMath>
+                </a14:m>
+                <a:r>
+                  <a:rPr lang="he-IL" b="1" dirty="0"/>
+                  <a:t>וממוצע חלון נע</a:t>
+                </a:r>
+              </a:p>
+            </p:txBody>
+          </p:sp>
+        </mc:Choice>
+        <mc:Fallback xmlns="">
+          <p:sp>
+            <p:nvSpPr>
+              <p:cNvPr id="2" name="Title 1">
+                <a:extLst>
+                  <a:ext uri="{FF2B5EF4-FFF2-40B4-BE49-F238E27FC236}">
+                    <a16:creationId xmlns:a16="http://schemas.microsoft.com/office/drawing/2014/main" id="{6853A274-BB0B-8EAD-6E04-6C0D93ADE66B}"/>
+                  </a:ext>
+                </a:extLst>
+              </p:cNvPr>
+              <p:cNvSpPr>
+                <a:spLocks noGrp="1" noRot="1" noChangeAspect="1" noMove="1" noResize="1" noEditPoints="1" noAdjustHandles="1" noChangeArrowheads="1" noChangeShapeType="1" noTextEdit="1"/>
+              </p:cNvSpPr>
+              <p:nvPr>
+                <p:ph type="title"/>
+              </p:nvPr>
+            </p:nvSpPr>
+            <p:spPr>
+              <a:blipFill>
+                <a:blip r:embed="rId2"/>
+                <a:stretch>
+                  <a:fillRect r="-1866"/>
+                </a:stretch>
+              </a:blipFill>
+            </p:spPr>
+            <p:txBody>
+              <a:bodyPr/>
+              <a:lstStyle/>
+              <a:p>
+                <a:r>
+                  <a:rPr lang="he-IL">
+                    <a:noFill/>
+                  </a:rPr>
+                  <a:t> </a:t>
+                </a:r>
+              </a:p>
+            </p:txBody>
+          </p:sp>
+        </mc:Fallback>
+      </mc:AlternateContent>
+      <mc:AlternateContent xmlns:mc="http://schemas.openxmlformats.org/markup-compatibility/2006" xmlns:a14="http://schemas.microsoft.com/office/drawing/2010/main">
+        <mc:Choice Requires="a14">
           <p:sp>
             <p:nvSpPr>
               <p:cNvPr id="3" name="Content Placeholder 2">
@@ -8123,7 +8291,7 @@
             </p:nvSpPr>
             <p:spPr/>
             <p:txBody>
-              <a:bodyPr/>
+              <a:bodyPr anchor="t"/>
               <a:lstStyle/>
               <a:p>
                 <a:pPr marL="0" indent="0">
@@ -8184,7 +8352,7 @@
                     <m:sSup>
                       <m:sSupPr>
                         <m:ctrlPr>
-                          <a:rPr lang="en-US" b="1" i="0" smtClean="0">
+                          <a:rPr lang="en-US" b="1" i="1" smtClean="0">
                             <a:latin typeface="Cambria Math" panose="02040503050406030204" pitchFamily="18" charset="0"/>
                             <a:ea typeface="Cambria Math" panose="02040503050406030204" pitchFamily="18" charset="0"/>
                           </a:rPr>
@@ -8326,13 +8494,13 @@
                 </a14:m>
                 <a:r>
                   <a:rPr lang="he-IL" dirty="0"/>
-                  <a:t> לאורך זמן לזיהוי תקלות מתונות ומתמשכות</a:t>
+                  <a:t> לאורך זמן לזיהוי תקלות מתונות ומתמשכות ולהתמודדות עם חיובים כוזבים</a:t>
                 </a:r>
               </a:p>
             </p:txBody>
           </p:sp>
         </mc:Choice>
-        <mc:Fallback>
+        <mc:Fallback xmlns="">
           <p:sp>
             <p:nvSpPr>
               <p:cNvPr id="3" name="Content Placeholder 2">
@@ -8351,9 +8519,9 @@
             </p:nvSpPr>
             <p:spPr>
               <a:blipFill>
-                <a:blip r:embed="rId2"/>
+                <a:blip r:embed="rId3"/>
                 <a:stretch>
-                  <a:fillRect r="-602"/>
+                  <a:fillRect t="-1002" r="-602"/>
                 </a:stretch>
               </a:blipFill>
             </p:spPr>
@@ -8402,8 +8570,8 @@
           <a:chExt cx="0" cy="0"/>
         </a:xfrm>
       </p:grpSpPr>
-      <mc:AlternateContent xmlns:mc="http://schemas.openxmlformats.org/markup-compatibility/2006">
-        <mc:Choice xmlns:a14="http://schemas.microsoft.com/office/drawing/2010/main" Requires="a14">
+      <mc:AlternateContent xmlns:mc="http://schemas.openxmlformats.org/markup-compatibility/2006" xmlns:a14="http://schemas.microsoft.com/office/drawing/2010/main">
+        <mc:Choice Requires="a14">
           <p:sp>
             <p:nvSpPr>
               <p:cNvPr id="2" name="Title 1">
@@ -8466,7 +8634,7 @@
             </p:txBody>
           </p:sp>
         </mc:Choice>
-        <mc:Fallback>
+        <mc:Fallback xmlns="">
           <p:sp>
             <p:nvSpPr>
               <p:cNvPr id="2" name="Title 1">
@@ -8506,8 +8674,8 @@
           </p:sp>
         </mc:Fallback>
       </mc:AlternateContent>
-      <mc:AlternateContent xmlns:mc="http://schemas.openxmlformats.org/markup-compatibility/2006">
-        <mc:Choice xmlns:a14="http://schemas.microsoft.com/office/drawing/2010/main" Requires="a14">
+      <mc:AlternateContent xmlns:mc="http://schemas.openxmlformats.org/markup-compatibility/2006" xmlns:a14="http://schemas.microsoft.com/office/drawing/2010/main">
+        <mc:Choice Requires="a14">
           <p:sp>
             <p:nvSpPr>
               <p:cNvPr id="3" name="Content Placeholder 2">
@@ -8531,7 +8699,7 @@
               </a:xfrm>
             </p:spPr>
             <p:txBody>
-              <a:bodyPr/>
+              <a:bodyPr anchor="t"/>
               <a:lstStyle/>
               <a:p>
                 <a:r>
@@ -9095,7 +9263,7 @@
                 </a14:m>
                 <a:r>
                   <a:rPr lang="he-IL" dirty="0"/>
-                  <a:t>. תחת פעולה תקינה </a:t>
+                  <a:t>. תחת </a:t>
                 </a:r>
                 <a14:m>
                   <m:oMath xmlns:m="http://schemas.openxmlformats.org/officeDocument/2006/math">
@@ -9133,6 +9301,13 @@
                             <a:latin typeface="Cambria Math" panose="02040503050406030204" pitchFamily="18" charset="0"/>
                           </a:rPr>
                           <m:t>𝑘</m:t>
+                        </m:r>
+                        <m:r>
+                          <m:rPr>
+                            <m:nor/>
+                          </m:rPr>
+                          <a:rPr lang="he-IL" dirty="0"/>
+                          <m:t>פעולה תקינה</m:t>
                         </m:r>
                       </m:sub>
                     </m:sSub>
@@ -9261,7 +9436,7 @@
             </p:txBody>
           </p:sp>
         </mc:Choice>
-        <mc:Fallback>
+        <mc:Fallback xmlns="">
           <p:sp>
             <p:nvSpPr>
               <p:cNvPr id="3" name="Content Placeholder 2">
@@ -9286,7 +9461,7 @@
               <a:blipFill>
                 <a:blip r:embed="rId3"/>
                 <a:stretch>
-                  <a:fillRect r="-378"/>
+                  <a:fillRect t="-835" r="-378"/>
                 </a:stretch>
               </a:blipFill>
             </p:spPr>
@@ -9351,14 +9526,21 @@
             <p:ph type="title"/>
           </p:nvPr>
         </p:nvSpPr>
-        <p:spPr/>
+        <p:spPr>
+          <a:xfrm>
+            <a:off x="1374774" y="609600"/>
+            <a:ext cx="10131425" cy="1456267"/>
+          </a:xfrm>
+        </p:spPr>
         <p:txBody>
-          <a:bodyPr/>
+          <a:bodyPr anchor="ctr">
+            <a:normAutofit/>
+          </a:bodyPr>
           <a:lstStyle/>
           <a:p>
             <a:r>
-              <a:rPr lang="he-IL" dirty="0"/>
-              <a:t>ניתוח חלון נע</a:t>
+              <a:rPr lang="he-IL" b="1" dirty="0"/>
+              <a:t>מבחן ממוצע חלון נע</a:t>
             </a:r>
           </a:p>
         </p:txBody>
@@ -9378,29 +9560,29 @@
                 <a:spLocks noGrp="1"/>
               </p:cNvSpPr>
               <p:nvPr>
-                <p:ph idx="1"/>
+                <p:ph sz="half" idx="1"/>
               </p:nvPr>
             </p:nvSpPr>
-            <p:spPr/>
+            <p:spPr>
+              <a:xfrm>
+                <a:off x="5320145" y="2142067"/>
+                <a:ext cx="6186053" cy="3649134"/>
+              </a:xfrm>
+            </p:spPr>
             <p:txBody>
-              <a:bodyPr/>
+              <a:bodyPr anchor="ctr">
+                <a:normAutofit lnSpcReduction="10000"/>
+              </a:bodyPr>
               <a:lstStyle/>
               <a:p>
-                <a:pPr marL="0" indent="0">
-                  <a:buNone/>
+                <a:pPr>
+                  <a:lnSpc>
+                    <a:spcPct val="90000"/>
+                  </a:lnSpc>
                 </a:pPr>
                 <a:r>
                   <a:rPr lang="he-IL" dirty="0"/>
-                  <a:t>מבחן חי בריבוע לא יצליח להתמודד עם תקלות מתונות וסטיות קבועות, לכן נוסיף שכבת זיהוי נוספת </a:t>
-                </a:r>
-              </a:p>
-              <a:p>
-                <a:pPr marL="0" indent="0">
-                  <a:buNone/>
-                </a:pPr>
-                <a:r>
-                  <a:rPr lang="he-IL" dirty="0"/>
-                  <a:t>ראשית, נעריך את </a:t>
+                  <a:t>נעריך את </a:t>
                 </a:r>
                 <a:r>
                   <a:rPr lang="he-IL" dirty="0" err="1"/>
@@ -9408,7 +9590,23 @@
                 </a:r>
                 <a:r>
                   <a:rPr lang="he-IL" dirty="0"/>
-                  <a:t> בפועל </a:t>
+                  <a:t> של </a:t>
+                </a:r>
+                <a:r>
+                  <a:rPr lang="he-IL" dirty="0" err="1"/>
+                  <a:t>האינובציה</a:t>
+                </a:r>
+                <a:r>
+                  <a:rPr lang="he-IL" dirty="0"/>
+                  <a:t> בעזרת </a:t>
+                </a:r>
+                <a:r>
+                  <a:rPr lang="he-IL" dirty="0" err="1"/>
+                  <a:t>אמדן</a:t>
+                </a:r>
+                <a:r>
+                  <a:rPr lang="he-IL" dirty="0"/>
+                  <a:t> מסוג חלון ממוצע נע </a:t>
                 </a:r>
                 <a14:m>
                   <m:oMath xmlns:m="http://schemas.openxmlformats.org/officeDocument/2006/math">
@@ -9468,15 +9666,662 @@
                         </m:r>
                       </m:den>
                     </m:f>
+                    <m:nary>
+                      <m:naryPr>
+                        <m:chr m:val="∑"/>
+                        <m:ctrlPr>
+                          <a:rPr lang="en-US" b="0" i="1" smtClean="0">
+                            <a:latin typeface="Cambria Math" panose="02040503050406030204" pitchFamily="18" charset="0"/>
+                          </a:rPr>
+                        </m:ctrlPr>
+                      </m:naryPr>
+                      <m:sub>
+                        <m:r>
+                          <m:rPr>
+                            <m:brk m:alnAt="23"/>
+                          </m:rPr>
+                          <a:rPr lang="en-US" b="0" i="1" smtClean="0">
+                            <a:latin typeface="Cambria Math" panose="02040503050406030204" pitchFamily="18" charset="0"/>
+                          </a:rPr>
+                          <m:t>𝑖</m:t>
+                        </m:r>
+                        <m:r>
+                          <a:rPr lang="en-US" b="0" i="1" smtClean="0">
+                            <a:latin typeface="Cambria Math" panose="02040503050406030204" pitchFamily="18" charset="0"/>
+                          </a:rPr>
+                          <m:t>=</m:t>
+                        </m:r>
+                        <m:r>
+                          <a:rPr lang="en-US" b="0" i="1" smtClean="0">
+                            <a:latin typeface="Cambria Math" panose="02040503050406030204" pitchFamily="18" charset="0"/>
+                          </a:rPr>
+                          <m:t>𝑘</m:t>
+                        </m:r>
+                        <m:r>
+                          <a:rPr lang="en-US" b="0" i="1" smtClean="0">
+                            <a:latin typeface="Cambria Math" panose="02040503050406030204" pitchFamily="18" charset="0"/>
+                          </a:rPr>
+                          <m:t>−</m:t>
+                        </m:r>
+                        <m:r>
+                          <a:rPr lang="en-US" b="0" i="1" smtClean="0">
+                            <a:latin typeface="Cambria Math" panose="02040503050406030204" pitchFamily="18" charset="0"/>
+                          </a:rPr>
+                          <m:t>𝑁</m:t>
+                        </m:r>
+                        <m:r>
+                          <a:rPr lang="en-US" b="0" i="1" smtClean="0">
+                            <a:latin typeface="Cambria Math" panose="02040503050406030204" pitchFamily="18" charset="0"/>
+                          </a:rPr>
+                          <m:t>+</m:t>
+                        </m:r>
+                        <m:r>
+                          <m:rPr>
+                            <m:brk m:alnAt="23"/>
+                          </m:rPr>
+                          <a:rPr lang="en-US" b="0" i="1" smtClean="0">
+                            <a:latin typeface="Cambria Math" panose="02040503050406030204" pitchFamily="18" charset="0"/>
+                          </a:rPr>
+                          <m:t>1</m:t>
+                        </m:r>
+                      </m:sub>
+                      <m:sup>
+                        <m:r>
+                          <a:rPr lang="en-US" b="0" i="1" smtClean="0">
+                            <a:latin typeface="Cambria Math" panose="02040503050406030204" pitchFamily="18" charset="0"/>
+                          </a:rPr>
+                          <m:t>𝑘</m:t>
+                        </m:r>
+                      </m:sup>
+                      <m:e>
+                        <m:sSub>
+                          <m:sSubPr>
+                            <m:ctrlPr>
+                              <a:rPr lang="en-US" b="0" i="1" smtClean="0">
+                                <a:latin typeface="Cambria Math" panose="02040503050406030204" pitchFamily="18" charset="0"/>
+                              </a:rPr>
+                            </m:ctrlPr>
+                          </m:sSubPr>
+                          <m:e>
+                            <m:r>
+                              <a:rPr lang="en-US" b="0" i="1" smtClean="0">
+                                <a:latin typeface="Cambria Math" panose="02040503050406030204" pitchFamily="18" charset="0"/>
+                              </a:rPr>
+                              <m:t>𝑟</m:t>
+                            </m:r>
+                          </m:e>
+                          <m:sub>
+                            <m:r>
+                              <a:rPr lang="en-US" b="0" i="1" smtClean="0">
+                                <a:latin typeface="Cambria Math" panose="02040503050406030204" pitchFamily="18" charset="0"/>
+                              </a:rPr>
+                              <m:t>𝑖</m:t>
+                            </m:r>
+                            <m:r>
+                              <a:rPr lang="en-US" b="0" i="1" smtClean="0">
+                                <a:latin typeface="Cambria Math" panose="02040503050406030204" pitchFamily="18" charset="0"/>
+                              </a:rPr>
+                              <m:t>,</m:t>
+                            </m:r>
+                            <m:r>
+                              <a:rPr lang="en-US" b="0" i="1" smtClean="0">
+                                <a:latin typeface="Cambria Math" panose="02040503050406030204" pitchFamily="18" charset="0"/>
+                              </a:rPr>
+                              <m:t>𝑘</m:t>
+                            </m:r>
+                          </m:sub>
+                        </m:sSub>
+                        <m:sSubSup>
+                          <m:sSubSupPr>
+                            <m:ctrlPr>
+                              <a:rPr lang="en-US" b="0" i="1" smtClean="0">
+                                <a:latin typeface="Cambria Math" panose="02040503050406030204" pitchFamily="18" charset="0"/>
+                              </a:rPr>
+                            </m:ctrlPr>
+                          </m:sSubSupPr>
+                          <m:e>
+                            <m:r>
+                              <a:rPr lang="en-US" b="0" i="1" smtClean="0">
+                                <a:latin typeface="Cambria Math" panose="02040503050406030204" pitchFamily="18" charset="0"/>
+                              </a:rPr>
+                              <m:t>𝑟</m:t>
+                            </m:r>
+                          </m:e>
+                          <m:sub>
+                            <m:r>
+                              <a:rPr lang="en-US" b="0" i="1" smtClean="0">
+                                <a:latin typeface="Cambria Math" panose="02040503050406030204" pitchFamily="18" charset="0"/>
+                              </a:rPr>
+                              <m:t>𝑖</m:t>
+                            </m:r>
+                            <m:r>
+                              <a:rPr lang="en-US" b="0" i="1" smtClean="0">
+                                <a:latin typeface="Cambria Math" panose="02040503050406030204" pitchFamily="18" charset="0"/>
+                              </a:rPr>
+                              <m:t>,</m:t>
+                            </m:r>
+                            <m:r>
+                              <a:rPr lang="en-US" b="0" i="1" smtClean="0">
+                                <a:latin typeface="Cambria Math" panose="02040503050406030204" pitchFamily="18" charset="0"/>
+                              </a:rPr>
+                              <m:t>𝑘</m:t>
+                            </m:r>
+                          </m:sub>
+                          <m:sup>
+                            <m:r>
+                              <a:rPr lang="en-US" b="0" i="1" smtClean="0">
+                                <a:latin typeface="Cambria Math" panose="02040503050406030204" pitchFamily="18" charset="0"/>
+                              </a:rPr>
+                              <m:t>𝑇</m:t>
+                            </m:r>
+                          </m:sup>
+                        </m:sSubSup>
+                      </m:e>
+                    </m:nary>
+                  </m:oMath>
+                </a14:m>
+                <a:r>
+                  <a:rPr lang="he-IL" dirty="0"/>
+                  <a:t>.</a:t>
+                </a:r>
+              </a:p>
+              <a:p>
+                <a:pPr>
+                  <a:lnSpc>
+                    <a:spcPct val="90000"/>
+                  </a:lnSpc>
+                </a:pPr>
+                <a:r>
+                  <a:rPr lang="he-IL" dirty="0"/>
+                  <a:t>מרווח החלון </a:t>
+                </a:r>
+                <a:r>
+                  <a:rPr lang="en-US" dirty="0"/>
+                  <a:t>N</a:t>
+                </a:r>
+                <a:r>
+                  <a:rPr lang="he-IL" dirty="0"/>
+                  <a:t> נבחר לכל יישום, כאשר לרוב הערכים הם בין 10 ל-12 </a:t>
+                </a:r>
+              </a:p>
+              <a:p>
+                <a:pPr>
+                  <a:lnSpc>
+                    <a:spcPct val="90000"/>
+                  </a:lnSpc>
+                </a:pPr>
+                <a:r>
+                  <a:rPr lang="he-IL" dirty="0"/>
+                  <a:t> </a:t>
+                </a:r>
+                <a:r>
+                  <a:rPr lang="he-IL" dirty="0" err="1"/>
+                  <a:t>האמדן</a:t>
+                </a:r>
+                <a:r>
+                  <a:rPr lang="he-IL" dirty="0"/>
+                  <a:t> </a:t>
+                </a:r>
+                <a14:m>
+                  <m:oMath xmlns:m="http://schemas.openxmlformats.org/officeDocument/2006/math">
+                    <m:sSub>
+                      <m:sSubPr>
+                        <m:ctrlPr>
+                          <a:rPr lang="en-US" b="0" i="1" smtClean="0">
+                            <a:latin typeface="Cambria Math" panose="02040503050406030204" pitchFamily="18" charset="0"/>
+                          </a:rPr>
+                        </m:ctrlPr>
+                      </m:sSubPr>
+                      <m:e>
+                        <m:r>
+                          <a:rPr lang="en-US" b="0" i="1" smtClean="0">
+                            <a:latin typeface="Cambria Math" panose="02040503050406030204" pitchFamily="18" charset="0"/>
+                          </a:rPr>
+                          <m:t>𝑎</m:t>
+                        </m:r>
+                      </m:e>
+                      <m:sub>
+                        <m:r>
+                          <a:rPr lang="en-US" b="0" i="1" smtClean="0">
+                            <a:latin typeface="Cambria Math" panose="02040503050406030204" pitchFamily="18" charset="0"/>
+                          </a:rPr>
+                          <m:t>𝑟</m:t>
+                        </m:r>
+                      </m:sub>
+                    </m:sSub>
+                  </m:oMath>
+                </a14:m>
+                <a:r>
+                  <a:rPr lang="he-IL" dirty="0"/>
+                  <a:t> מושווה אל מול </a:t>
+                </a:r>
+                <a:r>
+                  <a:rPr lang="he-IL" dirty="0" err="1"/>
+                  <a:t>הקוואריאנס</a:t>
+                </a:r>
+                <a:r>
+                  <a:rPr lang="he-IL" dirty="0"/>
+                  <a:t> התיאורטי </a:t>
+                </a:r>
+                <a14:m>
+                  <m:oMath xmlns:m="http://schemas.openxmlformats.org/officeDocument/2006/math">
+                    <m:sSub>
+                      <m:sSubPr>
+                        <m:ctrlPr>
+                          <a:rPr lang="en-US" i="1">
+                            <a:latin typeface="Cambria Math" panose="02040503050406030204" pitchFamily="18" charset="0"/>
+                          </a:rPr>
+                        </m:ctrlPr>
+                      </m:sSubPr>
+                      <m:e>
+                        <m:r>
+                          <a:rPr lang="en-US" i="1">
+                            <a:latin typeface="Cambria Math" panose="02040503050406030204" pitchFamily="18" charset="0"/>
+                          </a:rPr>
+                          <m:t>𝑊</m:t>
+                        </m:r>
+                      </m:e>
+                      <m:sub>
+                        <m:r>
+                          <a:rPr lang="en-US" i="1">
+                            <a:latin typeface="Cambria Math" panose="02040503050406030204" pitchFamily="18" charset="0"/>
+                          </a:rPr>
+                          <m:t>𝑖</m:t>
+                        </m:r>
+                        <m:r>
+                          <a:rPr lang="en-US" i="1">
+                            <a:latin typeface="Cambria Math" panose="02040503050406030204" pitchFamily="18" charset="0"/>
+                          </a:rPr>
+                          <m:t>,</m:t>
+                        </m:r>
+                        <m:r>
+                          <a:rPr lang="en-US" i="1">
+                            <a:latin typeface="Cambria Math" panose="02040503050406030204" pitchFamily="18" charset="0"/>
+                          </a:rPr>
+                          <m:t>𝑘</m:t>
+                        </m:r>
+                      </m:sub>
+                    </m:sSub>
+                  </m:oMath>
+                </a14:m>
+                <a:r>
+                  <a:rPr lang="en-US" dirty="0"/>
+                  <a:t> </a:t>
+                </a:r>
+                <a:r>
+                  <a:rPr lang="he-IL" dirty="0"/>
+                  <a:t> באופן הבא: </a:t>
+                </a:r>
+                <a14:m>
+                  <m:oMath xmlns:m="http://schemas.openxmlformats.org/officeDocument/2006/math">
                     <m:r>
                       <a:rPr lang="en-US" b="0" i="1" smtClean="0">
                         <a:latin typeface="Cambria Math" panose="02040503050406030204" pitchFamily="18" charset="0"/>
                       </a:rPr>
-                      <m:t>∑</m:t>
+                      <m:t>𝜂</m:t>
+                    </m:r>
+                    <m:r>
+                      <a:rPr lang="en-US" b="0" i="1" smtClean="0">
+                        <a:latin typeface="Cambria Math" panose="02040503050406030204" pitchFamily="18" charset="0"/>
+                      </a:rPr>
+                      <m:t>=</m:t>
+                    </m:r>
+                    <m:f>
+                      <m:fPr>
+                        <m:ctrlPr>
+                          <a:rPr lang="en-US" b="0" i="1" smtClean="0">
+                            <a:latin typeface="Cambria Math" panose="02040503050406030204" pitchFamily="18" charset="0"/>
+                          </a:rPr>
+                        </m:ctrlPr>
+                      </m:fPr>
+                      <m:num>
+                        <m:r>
+                          <a:rPr lang="en-US" b="0" i="1" smtClean="0">
+                            <a:latin typeface="Cambria Math" panose="02040503050406030204" pitchFamily="18" charset="0"/>
+                          </a:rPr>
+                          <m:t>𝑡𝑟</m:t>
+                        </m:r>
+                        <m:d>
+                          <m:dPr>
+                            <m:ctrlPr>
+                              <a:rPr lang="en-US" b="0" i="1" smtClean="0">
+                                <a:latin typeface="Cambria Math" panose="02040503050406030204" pitchFamily="18" charset="0"/>
+                              </a:rPr>
+                            </m:ctrlPr>
+                          </m:dPr>
+                          <m:e>
+                            <m:sSub>
+                              <m:sSubPr>
+                                <m:ctrlPr>
+                                  <a:rPr lang="en-US" i="1">
+                                    <a:latin typeface="Cambria Math" panose="02040503050406030204" pitchFamily="18" charset="0"/>
+                                  </a:rPr>
+                                </m:ctrlPr>
+                              </m:sSubPr>
+                              <m:e>
+                                <m:r>
+                                  <a:rPr lang="en-US" i="1">
+                                    <a:latin typeface="Cambria Math" panose="02040503050406030204" pitchFamily="18" charset="0"/>
+                                  </a:rPr>
+                                  <m:t>𝑊</m:t>
+                                </m:r>
+                              </m:e>
+                              <m:sub>
+                                <m:r>
+                                  <a:rPr lang="en-US" i="1">
+                                    <a:latin typeface="Cambria Math" panose="02040503050406030204" pitchFamily="18" charset="0"/>
+                                  </a:rPr>
+                                  <m:t>𝑖</m:t>
+                                </m:r>
+                                <m:r>
+                                  <a:rPr lang="en-US" i="1">
+                                    <a:latin typeface="Cambria Math" panose="02040503050406030204" pitchFamily="18" charset="0"/>
+                                  </a:rPr>
+                                  <m:t>,</m:t>
+                                </m:r>
+                                <m:r>
+                                  <a:rPr lang="en-US" i="1">
+                                    <a:latin typeface="Cambria Math" panose="02040503050406030204" pitchFamily="18" charset="0"/>
+                                  </a:rPr>
+                                  <m:t>𝑘</m:t>
+                                </m:r>
+                              </m:sub>
+                            </m:sSub>
+                          </m:e>
+                        </m:d>
+                      </m:num>
+                      <m:den>
+                        <m:r>
+                          <a:rPr lang="en-US" b="0" i="1" smtClean="0">
+                            <a:latin typeface="Cambria Math" panose="02040503050406030204" pitchFamily="18" charset="0"/>
+                          </a:rPr>
+                          <m:t>𝑡𝑟</m:t>
+                        </m:r>
+                        <m:d>
+                          <m:dPr>
+                            <m:ctrlPr>
+                              <a:rPr lang="en-US" b="0" i="1" smtClean="0">
+                                <a:latin typeface="Cambria Math" panose="02040503050406030204" pitchFamily="18" charset="0"/>
+                              </a:rPr>
+                            </m:ctrlPr>
+                          </m:dPr>
+                          <m:e>
+                            <m:sSub>
+                              <m:sSubPr>
+                                <m:ctrlPr>
+                                  <a:rPr lang="en-US" b="0" i="1" smtClean="0">
+                                    <a:latin typeface="Cambria Math" panose="02040503050406030204" pitchFamily="18" charset="0"/>
+                                  </a:rPr>
+                                </m:ctrlPr>
+                              </m:sSubPr>
+                              <m:e>
+                                <m:r>
+                                  <a:rPr lang="en-US" b="0" i="1" smtClean="0">
+                                    <a:latin typeface="Cambria Math" panose="02040503050406030204" pitchFamily="18" charset="0"/>
+                                  </a:rPr>
+                                  <m:t>𝑎</m:t>
+                                </m:r>
+                              </m:e>
+                              <m:sub>
+                                <m:r>
+                                  <a:rPr lang="en-US" b="0" i="1" smtClean="0">
+                                    <a:latin typeface="Cambria Math" panose="02040503050406030204" pitchFamily="18" charset="0"/>
+                                  </a:rPr>
+                                  <m:t>𝑖</m:t>
+                                </m:r>
+                                <m:r>
+                                  <a:rPr lang="en-US" b="0" i="1" smtClean="0">
+                                    <a:latin typeface="Cambria Math" panose="02040503050406030204" pitchFamily="18" charset="0"/>
+                                  </a:rPr>
+                                  <m:t>,</m:t>
+                                </m:r>
+                                <m:r>
+                                  <a:rPr lang="en-US" b="0" i="1" smtClean="0">
+                                    <a:latin typeface="Cambria Math" panose="02040503050406030204" pitchFamily="18" charset="0"/>
+                                  </a:rPr>
+                                  <m:t>𝑘</m:t>
+                                </m:r>
+                              </m:sub>
+                            </m:sSub>
+                          </m:e>
+                        </m:d>
+                      </m:den>
+                    </m:f>
+                  </m:oMath>
+                </a14:m>
+                <a:endParaRPr lang="en-US" dirty="0"/>
+              </a:p>
+              <a:p>
+                <a:pPr>
+                  <a:lnSpc>
+                    <a:spcPct val="90000"/>
+                  </a:lnSpc>
+                </a:pPr>
+                <a:r>
+                  <a:rPr lang="he-IL" dirty="0"/>
+                  <a:t>אם </a:t>
+                </a:r>
+                <a14:m>
+                  <m:oMath xmlns:m="http://schemas.openxmlformats.org/officeDocument/2006/math">
+                    <m:r>
+                      <a:rPr lang="en-US" b="0" i="1" smtClean="0">
+                        <a:latin typeface="Cambria Math" panose="02040503050406030204" pitchFamily="18" charset="0"/>
+                      </a:rPr>
+                      <m:t>𝜂</m:t>
+                    </m:r>
+                    <m:r>
+                      <a:rPr lang="en-US" b="0" i="1" smtClean="0">
+                        <a:latin typeface="Cambria Math" panose="02040503050406030204" pitchFamily="18" charset="0"/>
+                      </a:rPr>
+                      <m:t>∈[</m:t>
+                    </m:r>
+                    <m:r>
+                      <a:rPr lang="en-US" b="0" i="1" smtClean="0">
+                        <a:latin typeface="Cambria Math" panose="02040503050406030204" pitchFamily="18" charset="0"/>
+                      </a:rPr>
+                      <m:t>0</m:t>
+                    </m:r>
+                    <m:r>
+                      <a:rPr lang="en-US" b="0" i="1" smtClean="0">
+                        <a:latin typeface="Cambria Math" panose="02040503050406030204" pitchFamily="18" charset="0"/>
+                      </a:rPr>
+                      <m:t>.</m:t>
+                    </m:r>
+                    <m:r>
+                      <a:rPr lang="en-US" b="0" i="1" smtClean="0">
+                        <a:latin typeface="Cambria Math" panose="02040503050406030204" pitchFamily="18" charset="0"/>
+                      </a:rPr>
+                      <m:t>5</m:t>
+                    </m:r>
+                    <m:r>
+                      <a:rPr lang="en-US" b="0" i="1" smtClean="0">
+                        <a:latin typeface="Cambria Math" panose="02040503050406030204" pitchFamily="18" charset="0"/>
+                      </a:rPr>
+                      <m:t>,</m:t>
+                    </m:r>
+                    <m:r>
+                      <a:rPr lang="en-US" b="0" i="1" smtClean="0">
+                        <a:latin typeface="Cambria Math" panose="02040503050406030204" pitchFamily="18" charset="0"/>
+                      </a:rPr>
+                      <m:t>1</m:t>
+                    </m:r>
+                    <m:r>
+                      <a:rPr lang="en-US" b="0" i="1" smtClean="0">
+                        <a:latin typeface="Cambria Math" panose="02040503050406030204" pitchFamily="18" charset="0"/>
+                      </a:rPr>
+                      <m:t>.</m:t>
+                    </m:r>
+                    <m:r>
+                      <a:rPr lang="en-US" b="0" i="1" smtClean="0">
+                        <a:latin typeface="Cambria Math" panose="02040503050406030204" pitchFamily="18" charset="0"/>
+                      </a:rPr>
+                      <m:t>5</m:t>
+                    </m:r>
+                    <m:r>
+                      <a:rPr lang="en-US" b="0" i="1" smtClean="0">
+                        <a:latin typeface="Cambria Math" panose="02040503050406030204" pitchFamily="18" charset="0"/>
+                      </a:rPr>
+                      <m:t>]</m:t>
                     </m:r>
                   </m:oMath>
                 </a14:m>
-                <a:endParaRPr lang="he-IL" dirty="0"/>
+                <a:r>
+                  <a:rPr lang="he-IL" dirty="0"/>
+                  <a:t> נאמר כי המערכת תקינה </a:t>
+                </a:r>
+              </a:p>
+              <a:p>
+                <a:pPr>
+                  <a:lnSpc>
+                    <a:spcPct val="90000"/>
+                  </a:lnSpc>
+                </a:pPr>
+                <a:r>
+                  <a:rPr lang="he-IL" dirty="0"/>
+                  <a:t>כאשר </a:t>
+                </a:r>
+                <a14:m>
+                  <m:oMath xmlns:m="http://schemas.openxmlformats.org/officeDocument/2006/math">
+                    <m:r>
+                      <a:rPr lang="en-US" b="0" i="1" smtClean="0">
+                        <a:latin typeface="Cambria Math" panose="02040503050406030204" pitchFamily="18" charset="0"/>
+                      </a:rPr>
+                      <m:t>𝜂</m:t>
+                    </m:r>
+                    <m:r>
+                      <a:rPr lang="en-US" b="0" i="1" smtClean="0">
+                        <a:latin typeface="Cambria Math" panose="02040503050406030204" pitchFamily="18" charset="0"/>
+                      </a:rPr>
+                      <m:t>&gt;</m:t>
+                    </m:r>
+                    <m:r>
+                      <a:rPr lang="en-US" b="0" i="1" smtClean="0">
+                        <a:latin typeface="Cambria Math" panose="02040503050406030204" pitchFamily="18" charset="0"/>
+                      </a:rPr>
+                      <m:t>2</m:t>
+                    </m:r>
+                    <m:r>
+                      <a:rPr lang="en-US" b="0" i="1" smtClean="0">
+                        <a:latin typeface="Cambria Math" panose="02040503050406030204" pitchFamily="18" charset="0"/>
+                      </a:rPr>
+                      <m:t> </m:t>
+                    </m:r>
+                    <m:r>
+                      <m:rPr>
+                        <m:nor/>
+                      </m:rPr>
+                      <a:rPr lang="en-US" b="0" i="0" smtClean="0"/>
+                      <m:t>or</m:t>
+                    </m:r>
+                    <m:r>
+                      <m:rPr>
+                        <m:nor/>
+                      </m:rPr>
+                      <a:rPr lang="en-US" b="0" i="0" smtClean="0"/>
+                      <m:t> </m:t>
+                    </m:r>
+                    <m:r>
+                      <a:rPr lang="en-US" b="0" i="1" smtClean="0">
+                        <a:latin typeface="Cambria Math" panose="02040503050406030204" pitchFamily="18" charset="0"/>
+                      </a:rPr>
+                      <m:t>𝜂</m:t>
+                    </m:r>
+                    <m:r>
+                      <a:rPr lang="en-US" b="0" i="1" smtClean="0">
+                        <a:latin typeface="Cambria Math" panose="02040503050406030204" pitchFamily="18" charset="0"/>
+                      </a:rPr>
+                      <m:t>&lt;</m:t>
+                    </m:r>
+                    <m:r>
+                      <a:rPr lang="en-US" b="0" i="1" smtClean="0">
+                        <a:latin typeface="Cambria Math" panose="02040503050406030204" pitchFamily="18" charset="0"/>
+                      </a:rPr>
+                      <m:t>0</m:t>
+                    </m:r>
+                    <m:r>
+                      <a:rPr lang="en-US" b="0" i="1" smtClean="0">
+                        <a:latin typeface="Cambria Math" panose="02040503050406030204" pitchFamily="18" charset="0"/>
+                      </a:rPr>
+                      <m:t>.</m:t>
+                    </m:r>
+                    <m:r>
+                      <a:rPr lang="en-US" b="0" i="1" smtClean="0">
+                        <a:latin typeface="Cambria Math" panose="02040503050406030204" pitchFamily="18" charset="0"/>
+                      </a:rPr>
+                      <m:t>2</m:t>
+                    </m:r>
+                  </m:oMath>
+                </a14:m>
+                <a:r>
+                  <a:rPr lang="he-IL" dirty="0"/>
+                  <a:t> קיימת תקלה</a:t>
+                </a:r>
+              </a:p>
+              <a:p>
+                <a:pPr>
+                  <a:lnSpc>
+                    <a:spcPct val="90000"/>
+                  </a:lnSpc>
+                </a:pPr>
+                <a:r>
+                  <a:rPr lang="he-IL" dirty="0">
+                    <a:solidFill>
+                      <a:srgbClr val="FF0000"/>
+                    </a:solidFill>
+                    <a:highlight>
+                      <a:srgbClr val="FFFF00"/>
+                    </a:highlight>
+                  </a:rPr>
+                  <a:t>ובכל מקרה אחר מבחן זה אינו אפקטיבי ולא משפיע על הפילטר. </a:t>
+                </a:r>
+              </a:p>
+              <a:p>
+                <a:pPr>
+                  <a:lnSpc>
+                    <a:spcPct val="90000"/>
+                  </a:lnSpc>
+                </a:pPr>
+                <a:r>
+                  <a:rPr lang="he-IL" dirty="0"/>
+                  <a:t>המבחן מבוצע לאחר מבחן</a:t>
+                </a:r>
+                <a14:m>
+                  <m:oMath xmlns:m="http://schemas.openxmlformats.org/officeDocument/2006/math">
+                    <m:sSup>
+                      <m:sSupPr>
+                        <m:ctrlPr>
+                          <a:rPr lang="en-US" b="0" i="1" smtClean="0">
+                            <a:latin typeface="Cambria Math" panose="02040503050406030204" pitchFamily="18" charset="0"/>
+                          </a:rPr>
+                        </m:ctrlPr>
+                      </m:sSupPr>
+                      <m:e>
+                        <m:r>
+                          <a:rPr lang="en-US" b="0" i="1" smtClean="0">
+                            <a:latin typeface="Cambria Math" panose="02040503050406030204" pitchFamily="18" charset="0"/>
+                          </a:rPr>
+                          <m:t>𝜒</m:t>
+                        </m:r>
+                      </m:e>
+                      <m:sup>
+                        <m:r>
+                          <a:rPr lang="en-US" b="0" i="1" smtClean="0">
+                            <a:latin typeface="Cambria Math" panose="02040503050406030204" pitchFamily="18" charset="0"/>
+                          </a:rPr>
+                          <m:t>2</m:t>
+                        </m:r>
+                      </m:sup>
+                    </m:sSup>
+                  </m:oMath>
+                </a14:m>
+                <a:r>
+                  <a:rPr lang="en-US" dirty="0"/>
+                  <a:t> </a:t>
+                </a:r>
+                <a:r>
+                  <a:rPr lang="he-IL" dirty="0"/>
+                  <a:t> ושכן יכול לדרוס את תוצאת התקינות של המבחן הקודם.</a:t>
+                </a:r>
               </a:p>
             </p:txBody>
           </p:sp>
@@ -9495,14 +10340,18 @@
                 <a:spLocks noGrp="1" noRot="1" noChangeAspect="1" noMove="1" noResize="1" noEditPoints="1" noAdjustHandles="1" noChangeArrowheads="1" noChangeShapeType="1" noTextEdit="1"/>
               </p:cNvSpPr>
               <p:nvPr>
-                <p:ph idx="1"/>
+                <p:ph sz="half" idx="1"/>
               </p:nvPr>
             </p:nvSpPr>
             <p:spPr>
+              <a:xfrm>
+                <a:off x="5320145" y="2142067"/>
+                <a:ext cx="6186053" cy="3649134"/>
+              </a:xfrm>
               <a:blipFill>
-                <a:blip r:embed="rId2"/>
+                <a:blip r:embed="rId3"/>
                 <a:stretch>
-                  <a:fillRect r="-542"/>
+                  <a:fillRect t="-4674" r="-789" b="-1336"/>
                 </a:stretch>
               </a:blipFill>
             </p:spPr>
@@ -9521,10 +10370,312 @@
           </p:sp>
         </mc:Fallback>
       </mc:AlternateContent>
+      <p:pic>
+        <p:nvPicPr>
+          <p:cNvPr id="5" name="Picture 4" descr="A screenshot of a computer game&#10;&#10;AI-generated content may be incorrect.">
+            <a:extLst>
+              <a:ext uri="{FF2B5EF4-FFF2-40B4-BE49-F238E27FC236}">
+                <a16:creationId xmlns:a16="http://schemas.microsoft.com/office/drawing/2014/main" id="{2BC08775-A603-0C9C-7179-5AA62BC68B17}"/>
+              </a:ext>
+            </a:extLst>
+          </p:cNvPr>
+          <p:cNvPicPr>
+            <a:picLocks noChangeAspect="1"/>
+          </p:cNvPicPr>
+          <p:nvPr/>
+        </p:nvPicPr>
+        <p:blipFill>
+          <a:blip r:embed="rId4"/>
+          <a:stretch>
+            <a:fillRect/>
+          </a:stretch>
+        </p:blipFill>
+        <p:spPr>
+          <a:xfrm>
+            <a:off x="151614" y="2474278"/>
+            <a:ext cx="4995332" cy="2984711"/>
+          </a:xfrm>
+          <a:prstGeom prst="rect">
+            <a:avLst/>
+          </a:prstGeom>
+          <a:ln>
+            <a:noFill/>
+          </a:ln>
+          <a:effectLst>
+            <a:outerShdw blurRad="292100" dist="139700" dir="2700000" algn="tl" rotWithShape="0">
+              <a:srgbClr val="333333">
+                <a:alpha val="65000"/>
+              </a:srgbClr>
+            </a:outerShdw>
+          </a:effectLst>
+        </p:spPr>
+      </p:pic>
     </p:spTree>
     <p:extLst>
       <p:ext uri="{BB962C8B-B14F-4D97-AF65-F5344CB8AC3E}">
         <p14:creationId xmlns:p14="http://schemas.microsoft.com/office/powerpoint/2010/main" val="1209307768"/>
+      </p:ext>
+    </p:extLst>
+  </p:cSld>
+  <p:clrMapOvr>
+    <a:masterClrMapping/>
+  </p:clrMapOvr>
+</p:sld>
+</file>
+
+<file path=ppt/slides/slide18.xml><?xml version="1.0" encoding="utf-8"?>
+<p:sld xmlns:a="http://schemas.openxmlformats.org/drawingml/2006/main" xmlns:r="http://schemas.openxmlformats.org/officeDocument/2006/relationships" xmlns:p="http://schemas.openxmlformats.org/presentationml/2006/main">
+  <p:cSld>
+    <p:spTree>
+      <p:nvGrpSpPr>
+        <p:cNvPr id="1" name=""/>
+        <p:cNvGrpSpPr/>
+        <p:nvPr/>
+      </p:nvGrpSpPr>
+      <p:grpSpPr>
+        <a:xfrm>
+          <a:off x="0" y="0"/>
+          <a:ext cx="0" cy="0"/>
+          <a:chOff x="0" y="0"/>
+          <a:chExt cx="0" cy="0"/>
+        </a:xfrm>
+      </p:grpSpPr>
+      <p:sp>
+        <p:nvSpPr>
+          <p:cNvPr id="2" name="Title 1">
+            <a:extLst>
+              <a:ext uri="{FF2B5EF4-FFF2-40B4-BE49-F238E27FC236}">
+                <a16:creationId xmlns:a16="http://schemas.microsoft.com/office/drawing/2014/main" id="{05A21175-6962-9F40-C1F6-8BD969212041}"/>
+              </a:ext>
+            </a:extLst>
+          </p:cNvPr>
+          <p:cNvSpPr>
+            <a:spLocks noGrp="1"/>
+          </p:cNvSpPr>
+          <p:nvPr>
+            <p:ph type="title"/>
+          </p:nvPr>
+        </p:nvSpPr>
+        <p:spPr/>
+        <p:txBody>
+          <a:bodyPr/>
+          <a:lstStyle/>
+          <a:p>
+            <a:r>
+              <a:rPr lang="he-IL" b="1" dirty="0"/>
+              <a:t>טיפול בשגיאה </a:t>
+            </a:r>
+          </a:p>
+        </p:txBody>
+      </p:sp>
+      <p:sp>
+        <p:nvSpPr>
+          <p:cNvPr id="3" name="Content Placeholder 2">
+            <a:extLst>
+              <a:ext uri="{FF2B5EF4-FFF2-40B4-BE49-F238E27FC236}">
+                <a16:creationId xmlns:a16="http://schemas.microsoft.com/office/drawing/2014/main" id="{8FED3D57-9BEB-0235-0FFB-86F9A5402EEA}"/>
+              </a:ext>
+            </a:extLst>
+          </p:cNvPr>
+          <p:cNvSpPr>
+            <a:spLocks noGrp="1"/>
+          </p:cNvSpPr>
+          <p:nvPr>
+            <p:ph idx="1"/>
+          </p:nvPr>
+        </p:nvSpPr>
+        <p:spPr/>
+        <p:txBody>
+          <a:bodyPr anchor="t"/>
+          <a:lstStyle/>
+          <a:p>
+            <a:pPr marL="0" indent="0">
+              <a:buNone/>
+            </a:pPr>
+            <a:r>
+              <a:rPr lang="he-IL" dirty="0"/>
+              <a:t>לצורך התמודדות עם שגיאה בחיישן, בחנו שלוש אפשרויות</a:t>
+            </a:r>
+          </a:p>
+          <a:p>
+            <a:pPr marL="342900" indent="-342900">
+              <a:buFont typeface="+mj-lt"/>
+              <a:buAutoNum type="arabicPeriod"/>
+            </a:pPr>
+            <a:r>
+              <a:rPr lang="he-IL" dirty="0"/>
+              <a:t>השמה של השערוך הלוקלי להיות השערוך של הפילטר הגלובלי </a:t>
+            </a:r>
+            <a:r>
+              <a:rPr lang="he-IL" dirty="0" err="1"/>
+              <a:t>באיטרציה</a:t>
+            </a:r>
+            <a:r>
+              <a:rPr lang="he-IL" dirty="0"/>
+              <a:t> הקודמת</a:t>
+            </a:r>
+          </a:p>
+          <a:p>
+            <a:pPr marL="342900" indent="-342900">
+              <a:buFont typeface="+mj-lt"/>
+              <a:buAutoNum type="arabicPeriod"/>
+            </a:pPr>
+            <a:r>
+              <a:rPr lang="he-IL" dirty="0"/>
+              <a:t>דילוג על שלב העדכון לחלוטין</a:t>
+            </a:r>
+          </a:p>
+          <a:p>
+            <a:pPr marL="342900" indent="-342900">
+              <a:buFont typeface="+mj-lt"/>
+              <a:buAutoNum type="arabicPeriod"/>
+            </a:pPr>
+            <a:r>
+              <a:rPr lang="he-IL" dirty="0"/>
+              <a:t>השמה של השערוך הלוקלי להיות השערוך של הפילטר הגלובלי </a:t>
+            </a:r>
+            <a:r>
+              <a:rPr lang="he-IL" dirty="0" err="1"/>
+              <a:t>באיטרציה</a:t>
+            </a:r>
+            <a:r>
+              <a:rPr lang="he-IL" dirty="0"/>
+              <a:t> הקודמת + הגדלת </a:t>
+            </a:r>
+            <a:r>
+              <a:rPr lang="he-IL" dirty="0" err="1"/>
+              <a:t>הקוואריאנס</a:t>
+            </a:r>
+            <a:endParaRPr lang="he-IL" dirty="0"/>
+          </a:p>
+          <a:p>
+            <a:pPr marL="0" indent="0">
+              <a:buNone/>
+            </a:pPr>
+            <a:endParaRPr lang="he-IL" dirty="0"/>
+          </a:p>
+          <a:p>
+            <a:pPr marL="0" indent="0">
+              <a:buNone/>
+            </a:pPr>
+            <a:r>
+              <a:rPr lang="he-IL" dirty="0"/>
+              <a:t>שלושת האפשרויות נבחנו באמצעות </a:t>
+            </a:r>
+            <a:r>
+              <a:rPr lang="he-IL" dirty="0" err="1"/>
+              <a:t>סימלוציית</a:t>
+            </a:r>
+            <a:r>
+              <a:rPr lang="he-IL" dirty="0"/>
+              <a:t> מונטה קרלו עם הפרמטרים הבאים:</a:t>
+            </a:r>
+            <a:r>
+              <a:rPr lang="en-US" dirty="0"/>
+              <a:t> </a:t>
+            </a:r>
+          </a:p>
+          <a:p>
+            <a:r>
+              <a:rPr lang="he-IL" dirty="0"/>
+              <a:t>הסתברות לשגיאת החיישנים נעו מ 0 ל0.15 </a:t>
+            </a:r>
+          </a:p>
+          <a:p>
+            <a:r>
+              <a:rPr lang="he-IL" dirty="0"/>
+              <a:t>גודל השגיאה נע מ25 ל 300 </a:t>
+            </a:r>
+          </a:p>
+        </p:txBody>
+      </p:sp>
+    </p:spTree>
+    <p:extLst>
+      <p:ext uri="{BB962C8B-B14F-4D97-AF65-F5344CB8AC3E}">
+        <p14:creationId xmlns:p14="http://schemas.microsoft.com/office/powerpoint/2010/main" val="2272053023"/>
+      </p:ext>
+    </p:extLst>
+  </p:cSld>
+  <p:clrMapOvr>
+    <a:masterClrMapping/>
+  </p:clrMapOvr>
+</p:sld>
+</file>
+
+<file path=ppt/slides/slide19.xml><?xml version="1.0" encoding="utf-8"?>
+<p:sld xmlns:a="http://schemas.openxmlformats.org/drawingml/2006/main" xmlns:r="http://schemas.openxmlformats.org/officeDocument/2006/relationships" xmlns:p="http://schemas.openxmlformats.org/presentationml/2006/main">
+  <p:cSld>
+    <p:spTree>
+      <p:nvGrpSpPr>
+        <p:cNvPr id="1" name=""/>
+        <p:cNvGrpSpPr/>
+        <p:nvPr/>
+      </p:nvGrpSpPr>
+      <p:grpSpPr>
+        <a:xfrm>
+          <a:off x="0" y="0"/>
+          <a:ext cx="0" cy="0"/>
+          <a:chOff x="0" y="0"/>
+          <a:chExt cx="0" cy="0"/>
+        </a:xfrm>
+      </p:grpSpPr>
+      <p:sp>
+        <p:nvSpPr>
+          <p:cNvPr id="2" name="Title 1">
+            <a:extLst>
+              <a:ext uri="{FF2B5EF4-FFF2-40B4-BE49-F238E27FC236}">
+                <a16:creationId xmlns:a16="http://schemas.microsoft.com/office/drawing/2014/main" id="{ACB270BA-66F1-E7DF-C158-650CD7257BF8}"/>
+              </a:ext>
+            </a:extLst>
+          </p:cNvPr>
+          <p:cNvSpPr>
+            <a:spLocks noGrp="1"/>
+          </p:cNvSpPr>
+          <p:nvPr>
+            <p:ph type="title"/>
+          </p:nvPr>
+        </p:nvSpPr>
+        <p:spPr/>
+        <p:txBody>
+          <a:bodyPr/>
+          <a:lstStyle/>
+          <a:p>
+            <a:r>
+              <a:rPr lang="he-IL" b="1" dirty="0"/>
+              <a:t>תוצאות סימולציית מונטה קרלו</a:t>
+            </a:r>
+          </a:p>
+        </p:txBody>
+      </p:sp>
+      <p:sp>
+        <p:nvSpPr>
+          <p:cNvPr id="3" name="Content Placeholder 2">
+            <a:extLst>
+              <a:ext uri="{FF2B5EF4-FFF2-40B4-BE49-F238E27FC236}">
+                <a16:creationId xmlns:a16="http://schemas.microsoft.com/office/drawing/2014/main" id="{719A754E-6FEA-0CD9-E40B-1F1E57491491}"/>
+              </a:ext>
+            </a:extLst>
+          </p:cNvPr>
+          <p:cNvSpPr>
+            <a:spLocks noGrp="1"/>
+          </p:cNvSpPr>
+          <p:nvPr>
+            <p:ph idx="1"/>
+          </p:nvPr>
+        </p:nvSpPr>
+        <p:spPr/>
+        <p:txBody>
+          <a:bodyPr/>
+          <a:lstStyle/>
+          <a:p>
+            <a:endParaRPr lang="he-IL"/>
+          </a:p>
+        </p:txBody>
+      </p:sp>
+    </p:spTree>
+    <p:extLst>
+      <p:ext uri="{BB962C8B-B14F-4D97-AF65-F5344CB8AC3E}">
+        <p14:creationId xmlns:p14="http://schemas.microsoft.com/office/powerpoint/2010/main" val="5618096"/>
       </p:ext>
     </p:extLst>
   </p:cSld>
@@ -9573,10 +10724,10 @@
           <a:lstStyle/>
           <a:p>
             <a:r>
-              <a:rPr lang="he-IL" dirty="0"/>
+              <a:rPr lang="he-IL" b="1" dirty="0"/>
               <a:t>רקע</a:t>
             </a:r>
-            <a:endParaRPr lang="LID4096" dirty="0"/>
+            <a:endParaRPr lang="LID4096" b="1" dirty="0"/>
           </a:p>
         </p:txBody>
       </p:sp>
@@ -9605,6 +10756,53 @@
           </a:p>
         </p:txBody>
       </p:sp>
+      <p:pic>
+        <p:nvPicPr>
+          <p:cNvPr id="2050" name="Picture 2" descr="Chess, chess pieces, game, knight icon - Download on Iconfinder">
+            <a:extLst>
+              <a:ext uri="{FF2B5EF4-FFF2-40B4-BE49-F238E27FC236}">
+                <a16:creationId xmlns:a16="http://schemas.microsoft.com/office/drawing/2014/main" id="{9041A279-FE0F-86AC-86CA-A7C19F9D7763}"/>
+              </a:ext>
+            </a:extLst>
+          </p:cNvPr>
+          <p:cNvPicPr>
+            <a:picLocks noChangeAspect="1" noChangeArrowheads="1"/>
+          </p:cNvPicPr>
+          <p:nvPr/>
+        </p:nvPicPr>
+        <p:blipFill>
+          <a:blip r:embed="rId2">
+            <a:extLst>
+              <a:ext uri="{28A0092B-C50C-407E-A947-70E740481C1C}">
+                <a14:useLocalDpi xmlns:a14="http://schemas.microsoft.com/office/drawing/2010/main" val="0"/>
+              </a:ext>
+            </a:extLst>
+          </a:blip>
+          <a:srcRect/>
+          <a:stretch>
+            <a:fillRect/>
+          </a:stretch>
+        </p:blipFill>
+        <p:spPr bwMode="auto">
+          <a:xfrm>
+            <a:off x="0" y="5147953"/>
+            <a:ext cx="1710047" cy="1710047"/>
+          </a:xfrm>
+          <a:prstGeom prst="rect">
+            <a:avLst/>
+          </a:prstGeom>
+          <a:noFill/>
+          <a:extLst>
+            <a:ext uri="{909E8E84-426E-40DD-AFC4-6F175D3DCCD1}">
+              <a14:hiddenFill xmlns:a14="http://schemas.microsoft.com/office/drawing/2010/main">
+                <a:solidFill>
+                  <a:srgbClr val="FFFFFF"/>
+                </a:solidFill>
+              </a14:hiddenFill>
+            </a:ext>
+          </a:extLst>
+        </p:spPr>
+      </p:pic>
     </p:spTree>
     <p:extLst>
       <p:ext uri="{BB962C8B-B14F-4D97-AF65-F5344CB8AC3E}">
@@ -9657,18 +10855,18 @@
           <a:lstStyle/>
           <a:p>
             <a:r>
-              <a:rPr lang="he-IL" dirty="0"/>
+              <a:rPr lang="he-IL" b="1" dirty="0"/>
               <a:t>יישום</a:t>
             </a:r>
             <a:r>
-              <a:rPr lang="en-US" dirty="0"/>
+              <a:rPr lang="en-US" b="1" dirty="0"/>
               <a:t> </a:t>
             </a:r>
             <a:r>
-              <a:rPr lang="he-IL" dirty="0"/>
+              <a:rPr lang="he-IL" b="1" dirty="0"/>
               <a:t> - מודל מערכת</a:t>
             </a:r>
-            <a:endParaRPr lang="LID4096" dirty="0"/>
+            <a:endParaRPr lang="LID4096" b="1" dirty="0"/>
           </a:p>
         </p:txBody>
       </p:sp>
@@ -9692,7 +10890,7 @@
             </p:nvSpPr>
             <p:spPr/>
             <p:txBody>
-              <a:bodyPr/>
+              <a:bodyPr anchor="t"/>
               <a:lstStyle/>
               <a:p>
                 <a:r>
@@ -10630,7 +11828,7 @@
               <a:blipFill>
                 <a:blip r:embed="rId2"/>
                 <a:stretch>
-                  <a:fillRect r="-482"/>
+                  <a:fillRect t="-835" r="-482"/>
                 </a:stretch>
               </a:blipFill>
             </p:spPr>
@@ -10639,7 +11837,7 @@
               <a:lstStyle/>
               <a:p>
                 <a:r>
-                  <a:rPr lang="LID4096">
+                  <a:rPr lang="he-IL">
                     <a:noFill/>
                   </a:rPr>
                   <a:t> </a:t>
@@ -10701,10 +11899,10 @@
           <a:lstStyle/>
           <a:p>
             <a:r>
-              <a:rPr lang="he-IL" dirty="0"/>
+              <a:rPr lang="he-IL" b="1" dirty="0"/>
               <a:t>יישום – מודל מדידות</a:t>
             </a:r>
-            <a:endParaRPr lang="LID4096" dirty="0"/>
+            <a:endParaRPr lang="LID4096" b="1" dirty="0"/>
           </a:p>
         </p:txBody>
       </p:sp>
@@ -10733,7 +11931,7 @@
               </a:xfrm>
             </p:spPr>
             <p:txBody>
-              <a:bodyPr/>
+              <a:bodyPr anchor="t"/>
               <a:lstStyle/>
               <a:p>
                 <a:r>
@@ -11681,7 +12879,7 @@
               <a:blipFill>
                 <a:blip r:embed="rId2"/>
                 <a:stretch>
-                  <a:fillRect r="-394"/>
+                  <a:fillRect t="-668" r="-394"/>
                 </a:stretch>
               </a:blipFill>
             </p:spPr>
@@ -11690,7 +12888,7 @@
               <a:lstStyle/>
               <a:p>
                 <a:r>
-                  <a:rPr lang="LID4096">
+                  <a:rPr lang="he-IL">
                     <a:noFill/>
                   </a:rPr>
                   <a:t> </a:t>
@@ -11752,18 +12950,18 @@
           <a:lstStyle/>
           <a:p>
             <a:r>
-              <a:rPr lang="he-IL" dirty="0"/>
+              <a:rPr lang="he-IL" b="1" dirty="0"/>
               <a:t>מבנה ה – </a:t>
             </a:r>
             <a:r>
-              <a:rPr lang="en-US" dirty="0"/>
+              <a:rPr lang="en-US" b="1" dirty="0"/>
               <a:t>FKF</a:t>
             </a:r>
             <a:r>
-              <a:rPr lang="he-IL" dirty="0"/>
+              <a:rPr lang="he-IL" b="1" dirty="0"/>
               <a:t> (הגדרת המסנן הגלובלי)</a:t>
             </a:r>
-            <a:endParaRPr lang="LID4096" dirty="0"/>
+            <a:endParaRPr lang="LID4096" b="1" dirty="0"/>
           </a:p>
         </p:txBody>
       </p:sp>
@@ -11787,7 +12985,7 @@
             </p:nvSpPr>
             <p:spPr/>
             <p:txBody>
-              <a:bodyPr>
+              <a:bodyPr anchor="t">
                 <a:normAutofit lnSpcReduction="10000"/>
               </a:bodyPr>
               <a:lstStyle/>
@@ -12645,7 +13843,7 @@
               <a:blipFill>
                 <a:blip r:embed="rId3"/>
                 <a:stretch>
-                  <a:fillRect t="-4007" r="-482"/>
+                  <a:fillRect t="-1503" r="-482"/>
                 </a:stretch>
               </a:blipFill>
             </p:spPr>
@@ -12654,7 +13852,7 @@
               <a:lstStyle/>
               <a:p>
                 <a:r>
-                  <a:rPr lang="LID4096">
+                  <a:rPr lang="he-IL">
                     <a:noFill/>
                   </a:rPr>
                   <a:t> </a:t>
@@ -12721,18 +13919,18 @@
           <a:lstStyle/>
           <a:p>
             <a:r>
-              <a:rPr lang="he-IL" dirty="0"/>
+              <a:rPr lang="he-IL" b="1" dirty="0"/>
               <a:t>מבנה ה – </a:t>
             </a:r>
             <a:r>
-              <a:rPr lang="en-US" dirty="0"/>
+              <a:rPr lang="en-US" b="1" dirty="0"/>
               <a:t>FKF</a:t>
             </a:r>
             <a:r>
-              <a:rPr lang="he-IL" dirty="0"/>
+              <a:rPr lang="he-IL" b="1" dirty="0"/>
               <a:t> (היתוך אופטימלי)</a:t>
             </a:r>
-            <a:endParaRPr lang="LID4096" dirty="0"/>
+            <a:endParaRPr lang="LID4096" b="1" dirty="0"/>
           </a:p>
         </p:txBody>
       </p:sp>
@@ -12761,7 +13959,7 @@
               </a:xfrm>
             </p:spPr>
             <p:txBody>
-              <a:bodyPr/>
+              <a:bodyPr anchor="t"/>
               <a:lstStyle/>
               <a:p>
                 <a:r>
@@ -13588,7 +14786,7 @@
               <a:blipFill>
                 <a:blip r:embed="rId3"/>
                 <a:stretch>
-                  <a:fillRect r="-402"/>
+                  <a:fillRect t="-1002" r="-402"/>
                 </a:stretch>
               </a:blipFill>
             </p:spPr>
@@ -13664,18 +14862,18 @@
           <a:lstStyle/>
           <a:p>
             <a:r>
-              <a:rPr lang="he-IL" dirty="0"/>
+              <a:rPr lang="he-IL" b="1" dirty="0"/>
               <a:t>מבנה ה – </a:t>
             </a:r>
             <a:r>
-              <a:rPr lang="en-US" dirty="0"/>
+              <a:rPr lang="en-US" b="1" dirty="0"/>
               <a:t>FKF</a:t>
             </a:r>
             <a:r>
-              <a:rPr lang="he-IL" dirty="0"/>
+              <a:rPr lang="he-IL" b="1" dirty="0"/>
               <a:t> (תהליך עדכון)</a:t>
             </a:r>
-            <a:endParaRPr lang="LID4096" dirty="0"/>
+            <a:endParaRPr lang="LID4096" b="1" dirty="0"/>
           </a:p>
         </p:txBody>
       </p:sp>
@@ -13699,7 +14897,7 @@
             </p:nvSpPr>
             <p:spPr/>
             <p:txBody>
-              <a:bodyPr/>
+              <a:bodyPr anchor="t"/>
               <a:lstStyle/>
               <a:p>
                 <a:r>
@@ -14800,7 +15998,7 @@
               <a:blipFill>
                 <a:blip r:embed="rId2"/>
                 <a:stretch>
-                  <a:fillRect l="-421" r="-482" b="-1503"/>
+                  <a:fillRect l="-421" t="-1002" r="-482" b="-501"/>
                 </a:stretch>
               </a:blipFill>
             </p:spPr>
@@ -14871,18 +16069,18 @@
           <a:lstStyle/>
           <a:p>
             <a:r>
-              <a:rPr lang="he-IL" dirty="0"/>
+              <a:rPr lang="he-IL" b="1" dirty="0"/>
               <a:t>מבנה ה – </a:t>
             </a:r>
             <a:r>
-              <a:rPr lang="en-US" dirty="0"/>
+              <a:rPr lang="en-US" b="1" dirty="0"/>
               <a:t>FKF</a:t>
             </a:r>
             <a:r>
-              <a:rPr lang="he-IL" dirty="0"/>
+              <a:rPr lang="he-IL" b="1" dirty="0"/>
               <a:t> (תהליך קידום)</a:t>
             </a:r>
-            <a:endParaRPr lang="LID4096" dirty="0"/>
+            <a:endParaRPr lang="LID4096" b="1" dirty="0"/>
           </a:p>
         </p:txBody>
       </p:sp>
@@ -14906,7 +16104,7 @@
             </p:nvSpPr>
             <p:spPr/>
             <p:txBody>
-              <a:bodyPr/>
+              <a:bodyPr anchor="t"/>
               <a:lstStyle/>
               <a:p>
                 <a:r>
@@ -16521,7 +17719,7 @@
               <a:blipFill>
                 <a:blip r:embed="rId2"/>
                 <a:stretch>
-                  <a:fillRect r="-482"/>
+                  <a:fillRect t="-1002" r="-482"/>
                 </a:stretch>
               </a:blipFill>
             </p:spPr>
@@ -16592,15 +17790,15 @@
           <a:lstStyle/>
           <a:p>
             <a:r>
-              <a:rPr lang="he-IL" dirty="0"/>
+              <a:rPr lang="he-IL" b="1" dirty="0"/>
               <a:t>מבנה ה – </a:t>
             </a:r>
             <a:r>
-              <a:rPr lang="en-US" dirty="0"/>
+              <a:rPr lang="en-US" b="1" dirty="0"/>
               <a:t>FKF</a:t>
             </a:r>
             <a:r>
-              <a:rPr lang="he-IL" dirty="0"/>
+              <a:rPr lang="he-IL" b="1" dirty="0"/>
               <a:t> (תהליך קידום)</a:t>
             </a:r>
           </a:p>
@@ -16631,7 +17829,7 @@
               </a:xfrm>
             </p:spPr>
             <p:txBody>
-              <a:bodyPr>
+              <a:bodyPr anchor="t">
                 <a:normAutofit fontScale="85000" lnSpcReduction="10000"/>
               </a:bodyPr>
               <a:lstStyle/>

</xml_diff>